<commit_message>
methods.tex: mention NIST's review process
</commit_message>
<xml_diff>
--- a/20131023-Hack.lu Lightning Talk ACH project.pptx
+++ b/20131023-Hack.lu Lightning Talk ACH project.pptx
@@ -11,7 +11,8 @@
     <p:sldId id="260" r:id="rId5"/>
     <p:sldId id="261" r:id="rId6"/>
     <p:sldId id="262" r:id="rId7"/>
-    <p:sldId id="257" r:id="rId8"/>
+    <p:sldId id="264" r:id="rId8"/>
+    <p:sldId id="257" r:id="rId9"/>
   </p:sldIdLst>
   <p:sldSz cx="9144000" cy="6858000" type="screen4x3"/>
   <p:notesSz cx="6858000" cy="9144000"/>
@@ -294,7 +295,7 @@
           <a:p>
             <a:fld id="{8862424E-C109-F440-84A3-689A668A7AFE}" type="datetimeFigureOut">
               <a:rPr lang="de-DE" smtClean="0"/>
-              <a:t>10/29/13</a:t>
+              <a:t>11/4/13</a:t>
             </a:fld>
             <a:endParaRPr lang="de-DE"/>
           </a:p>
@@ -464,7 +465,7 @@
           <a:p>
             <a:fld id="{8862424E-C109-F440-84A3-689A668A7AFE}" type="datetimeFigureOut">
               <a:rPr lang="de-DE" smtClean="0"/>
-              <a:t>10/29/13</a:t>
+              <a:t>11/4/13</a:t>
             </a:fld>
             <a:endParaRPr lang="de-DE"/>
           </a:p>
@@ -644,7 +645,7 @@
           <a:p>
             <a:fld id="{8862424E-C109-F440-84A3-689A668A7AFE}" type="datetimeFigureOut">
               <a:rPr lang="de-DE" smtClean="0"/>
-              <a:t>10/29/13</a:t>
+              <a:t>11/4/13</a:t>
             </a:fld>
             <a:endParaRPr lang="de-DE"/>
           </a:p>
@@ -814,7 +815,7 @@
           <a:p>
             <a:fld id="{8862424E-C109-F440-84A3-689A668A7AFE}" type="datetimeFigureOut">
               <a:rPr lang="de-DE" smtClean="0"/>
-              <a:t>10/29/13</a:t>
+              <a:t>11/4/13</a:t>
             </a:fld>
             <a:endParaRPr lang="de-DE"/>
           </a:p>
@@ -1060,7 +1061,7 @@
           <a:p>
             <a:fld id="{8862424E-C109-F440-84A3-689A668A7AFE}" type="datetimeFigureOut">
               <a:rPr lang="de-DE" smtClean="0"/>
-              <a:t>10/29/13</a:t>
+              <a:t>11/4/13</a:t>
             </a:fld>
             <a:endParaRPr lang="de-DE"/>
           </a:p>
@@ -1348,7 +1349,7 @@
           <a:p>
             <a:fld id="{8862424E-C109-F440-84A3-689A668A7AFE}" type="datetimeFigureOut">
               <a:rPr lang="de-DE" smtClean="0"/>
-              <a:t>10/29/13</a:t>
+              <a:t>11/4/13</a:t>
             </a:fld>
             <a:endParaRPr lang="de-DE"/>
           </a:p>
@@ -1770,7 +1771,7 @@
           <a:p>
             <a:fld id="{8862424E-C109-F440-84A3-689A668A7AFE}" type="datetimeFigureOut">
               <a:rPr lang="de-DE" smtClean="0"/>
-              <a:t>10/29/13</a:t>
+              <a:t>11/4/13</a:t>
             </a:fld>
             <a:endParaRPr lang="de-DE"/>
           </a:p>
@@ -1888,7 +1889,7 @@
           <a:p>
             <a:fld id="{8862424E-C109-F440-84A3-689A668A7AFE}" type="datetimeFigureOut">
               <a:rPr lang="de-DE" smtClean="0"/>
-              <a:t>10/29/13</a:t>
+              <a:t>11/4/13</a:t>
             </a:fld>
             <a:endParaRPr lang="de-DE"/>
           </a:p>
@@ -1983,7 +1984,7 @@
           <a:p>
             <a:fld id="{8862424E-C109-F440-84A3-689A668A7AFE}" type="datetimeFigureOut">
               <a:rPr lang="de-DE" smtClean="0"/>
-              <a:t>10/29/13</a:t>
+              <a:t>11/4/13</a:t>
             </a:fld>
             <a:endParaRPr lang="de-DE"/>
           </a:p>
@@ -2260,7 +2261,7 @@
           <a:p>
             <a:fld id="{8862424E-C109-F440-84A3-689A668A7AFE}" type="datetimeFigureOut">
               <a:rPr lang="de-DE" smtClean="0"/>
-              <a:t>10/29/13</a:t>
+              <a:t>11/4/13</a:t>
             </a:fld>
             <a:endParaRPr lang="de-DE"/>
           </a:p>
@@ -2513,7 +2514,7 @@
           <a:p>
             <a:fld id="{8862424E-C109-F440-84A3-689A668A7AFE}" type="datetimeFigureOut">
               <a:rPr lang="de-DE" smtClean="0"/>
-              <a:t>10/29/13</a:t>
+              <a:t>11/4/13</a:t>
             </a:fld>
             <a:endParaRPr lang="de-DE"/>
           </a:p>
@@ -2726,7 +2727,7 @@
           <a:p>
             <a:fld id="{8862424E-C109-F440-84A3-689A668A7AFE}" type="datetimeFigureOut">
               <a:rPr lang="de-DE" smtClean="0"/>
-              <a:t>10/29/13</a:t>
+              <a:t>11/4/13</a:t>
             </a:fld>
             <a:endParaRPr lang="de-DE"/>
           </a:p>
@@ -3951,6 +3952,11 @@
               </a:rPr>
               <a:t>!</a:t>
             </a:r>
+            <a:endParaRPr lang="de-DE" b="1" dirty="0" smtClean="0">
+              <a:solidFill>
+                <a:srgbClr val="000000"/>
+              </a:solidFill>
+            </a:endParaRPr>
           </a:p>
         </p:txBody>
       </p:sp>
@@ -4243,6 +4249,22 @@
           <a:p>
             <a:r>
               <a:rPr lang="de-DE" dirty="0" err="1" smtClean="0"/>
+              <a:t>ToC</a:t>
+            </a:r>
+            <a:r>
+              <a:rPr lang="de-DE" dirty="0" smtClean="0"/>
+              <a:t> so </a:t>
+            </a:r>
+            <a:r>
+              <a:rPr lang="de-DE" dirty="0" err="1" smtClean="0"/>
+              <a:t>far</a:t>
+            </a:r>
+            <a:r>
+              <a:rPr lang="de-DE" dirty="0" smtClean="0"/>
+              <a:t> - </a:t>
+            </a:r>
+            <a:r>
+              <a:rPr lang="de-DE" dirty="0" err="1" smtClean="0"/>
               <a:t>Practical</a:t>
             </a:r>
             <a:r>
@@ -4537,6 +4559,9 @@
               <a:rPr lang="de-DE" dirty="0" err="1" smtClean="0"/>
               <a:t>readable</a:t>
             </a:r>
+            <a:endParaRPr lang="de-DE" dirty="0" smtClean="0"/>
+          </a:p>
+          <a:p>
             <a:endParaRPr lang="de-DE" dirty="0"/>
           </a:p>
         </p:txBody>
@@ -4580,6 +4605,297 @@
       </p:grpSpPr>
       <p:sp>
         <p:nvSpPr>
+          <p:cNvPr id="2" name="Titel 1"/>
+          <p:cNvSpPr>
+            <a:spLocks noGrp="1"/>
+          </p:cNvSpPr>
+          <p:nvPr>
+            <p:ph type="title"/>
+          </p:nvPr>
+        </p:nvSpPr>
+        <p:spPr/>
+        <p:txBody>
+          <a:bodyPr/>
+          <a:lstStyle/>
+          <a:p>
+            <a:r>
+              <a:rPr lang="de-DE" dirty="0" err="1" smtClean="0"/>
+              <a:t>Current</a:t>
+            </a:r>
+            <a:r>
+              <a:rPr lang="de-DE" dirty="0" smtClean="0"/>
+              <a:t> </a:t>
+            </a:r>
+            <a:r>
+              <a:rPr lang="de-DE" dirty="0" err="1" smtClean="0"/>
+              <a:t>state</a:t>
+            </a:r>
+            <a:r>
+              <a:rPr lang="de-DE" dirty="0" smtClean="0"/>
+              <a:t> </a:t>
+            </a:r>
+            <a:r>
+              <a:rPr lang="de-DE" dirty="0" err="1" smtClean="0"/>
+              <a:t>as</a:t>
+            </a:r>
+            <a:r>
+              <a:rPr lang="de-DE" dirty="0" smtClean="0"/>
+              <a:t> of 2013/11/04</a:t>
+            </a:r>
+            <a:endParaRPr lang="de-DE" dirty="0"/>
+          </a:p>
+        </p:txBody>
+      </p:sp>
+      <p:sp>
+        <p:nvSpPr>
+          <p:cNvPr id="3" name="Inhaltsplatzhalter 2"/>
+          <p:cNvSpPr>
+            <a:spLocks noGrp="1"/>
+          </p:cNvSpPr>
+          <p:nvPr>
+            <p:ph idx="1"/>
+          </p:nvPr>
+        </p:nvSpPr>
+        <p:spPr/>
+        <p:txBody>
+          <a:bodyPr/>
+          <a:lstStyle/>
+          <a:p>
+            <a:r>
+              <a:rPr lang="de-DE" dirty="0" smtClean="0"/>
+              <a:t>Initial </a:t>
+            </a:r>
+            <a:r>
+              <a:rPr lang="de-DE" dirty="0" err="1" smtClean="0"/>
+              <a:t>ongoing</a:t>
+            </a:r>
+            <a:r>
+              <a:rPr lang="de-DE" dirty="0" smtClean="0"/>
+              <a:t> </a:t>
+            </a:r>
+            <a:r>
+              <a:rPr lang="de-DE" dirty="0" err="1" smtClean="0"/>
+              <a:t>work</a:t>
+            </a:r>
+            <a:r>
+              <a:rPr lang="de-DE" dirty="0" smtClean="0"/>
+              <a:t> in </a:t>
+            </a:r>
+            <a:r>
+              <a:rPr lang="de-DE" dirty="0" err="1" smtClean="0"/>
+              <a:t>the</a:t>
+            </a:r>
+            <a:r>
+              <a:rPr lang="de-DE" dirty="0" smtClean="0"/>
+              <a:t> </a:t>
+            </a:r>
+            <a:r>
+              <a:rPr lang="de-DE" dirty="0" err="1" smtClean="0"/>
+              <a:t>git</a:t>
+            </a:r>
+            <a:r>
+              <a:rPr lang="de-DE" dirty="0" smtClean="0"/>
+              <a:t> </a:t>
+            </a:r>
+            <a:r>
+              <a:rPr lang="de-DE" dirty="0" err="1" smtClean="0"/>
+              <a:t>repository</a:t>
+            </a:r>
+            <a:endParaRPr lang="de-DE" dirty="0" smtClean="0"/>
+          </a:p>
+          <a:p>
+            <a:r>
+              <a:rPr lang="de-DE" dirty="0" smtClean="0"/>
+              <a:t>More </a:t>
+            </a:r>
+            <a:r>
+              <a:rPr lang="de-DE" dirty="0" err="1" smtClean="0"/>
+              <a:t>testing</a:t>
+            </a:r>
+            <a:r>
+              <a:rPr lang="de-DE" dirty="0" smtClean="0"/>
+              <a:t> </a:t>
+            </a:r>
+            <a:r>
+              <a:rPr lang="de-DE" dirty="0" err="1" smtClean="0"/>
+              <a:t>needed</a:t>
+            </a:r>
+            <a:r>
+              <a:rPr lang="de-DE" dirty="0" smtClean="0"/>
+              <a:t>. </a:t>
+            </a:r>
+            <a:r>
+              <a:rPr lang="de-DE" dirty="0" err="1" smtClean="0"/>
+              <a:t>Especially</a:t>
+            </a:r>
+            <a:r>
+              <a:rPr lang="de-DE" dirty="0" smtClean="0"/>
+              <a:t> </a:t>
+            </a:r>
+            <a:r>
+              <a:rPr lang="de-DE" dirty="0" err="1" smtClean="0"/>
+              <a:t>compatibility</a:t>
+            </a:r>
+            <a:r>
+              <a:rPr lang="de-DE" dirty="0" smtClean="0"/>
+              <a:t> </a:t>
+            </a:r>
+            <a:r>
+              <a:rPr lang="de-DE" dirty="0" err="1" smtClean="0"/>
+              <a:t>with</a:t>
+            </a:r>
+            <a:r>
+              <a:rPr lang="de-DE" dirty="0" smtClean="0"/>
+              <a:t> </a:t>
+            </a:r>
+            <a:r>
+              <a:rPr lang="de-DE" dirty="0" err="1" smtClean="0"/>
+              <a:t>clients</a:t>
+            </a:r>
+            <a:r>
+              <a:rPr lang="de-DE" dirty="0" smtClean="0"/>
+              <a:t> </a:t>
+            </a:r>
+            <a:r>
+              <a:rPr lang="de-DE" dirty="0" err="1" smtClean="0"/>
+              <a:t>and</a:t>
+            </a:r>
+            <a:r>
+              <a:rPr lang="de-DE" dirty="0" smtClean="0"/>
+              <a:t> </a:t>
+            </a:r>
+            <a:r>
+              <a:rPr lang="de-DE" dirty="0" err="1" smtClean="0"/>
+              <a:t>when</a:t>
+            </a:r>
+            <a:r>
+              <a:rPr lang="de-DE" dirty="0" smtClean="0"/>
+              <a:t> </a:t>
+            </a:r>
+            <a:r>
+              <a:rPr lang="de-DE" dirty="0" err="1" smtClean="0"/>
+              <a:t>to</a:t>
+            </a:r>
+            <a:r>
+              <a:rPr lang="de-DE" dirty="0" smtClean="0"/>
+              <a:t> </a:t>
+            </a:r>
+            <a:r>
+              <a:rPr lang="de-DE" dirty="0" err="1" smtClean="0"/>
+              <a:t>simply</a:t>
+            </a:r>
+            <a:r>
+              <a:rPr lang="de-DE" dirty="0" smtClean="0"/>
+              <a:t> </a:t>
+            </a:r>
+            <a:r>
+              <a:rPr lang="de-DE" dirty="0" err="1" smtClean="0"/>
+              <a:t>ignore</a:t>
+            </a:r>
+            <a:r>
+              <a:rPr lang="de-DE" dirty="0" smtClean="0"/>
+              <a:t> </a:t>
+            </a:r>
+            <a:r>
+              <a:rPr lang="de-DE" dirty="0" err="1" smtClean="0"/>
+              <a:t>old</a:t>
+            </a:r>
+            <a:r>
+              <a:rPr lang="de-DE" dirty="0" smtClean="0"/>
+              <a:t> </a:t>
+            </a:r>
+            <a:r>
+              <a:rPr lang="de-DE" dirty="0" err="1" smtClean="0"/>
+              <a:t>clients</a:t>
+            </a:r>
+            <a:r>
+              <a:rPr lang="de-DE" dirty="0" smtClean="0"/>
+              <a:t> (RC4,...)</a:t>
+            </a:r>
+          </a:p>
+          <a:p>
+            <a:r>
+              <a:rPr lang="de-DE" dirty="0" smtClean="0"/>
+              <a:t> Need </a:t>
+            </a:r>
+            <a:r>
+              <a:rPr lang="de-DE" dirty="0" err="1" smtClean="0"/>
+              <a:t>to</a:t>
+            </a:r>
+            <a:r>
+              <a:rPr lang="de-DE" dirty="0" smtClean="0"/>
+              <a:t> </a:t>
+            </a:r>
+            <a:r>
+              <a:rPr lang="de-DE" dirty="0" err="1" smtClean="0"/>
+              <a:t>fill</a:t>
+            </a:r>
+            <a:r>
+              <a:rPr lang="de-DE" dirty="0" smtClean="0"/>
+              <a:t> in </a:t>
+            </a:r>
+            <a:r>
+              <a:rPr lang="de-DE" dirty="0" err="1" smtClean="0"/>
+              <a:t>other</a:t>
+            </a:r>
+            <a:r>
+              <a:rPr lang="de-DE" dirty="0" smtClean="0"/>
+              <a:t> </a:t>
+            </a:r>
+            <a:r>
+              <a:rPr lang="de-DE" dirty="0" err="1" smtClean="0"/>
+              <a:t>sections</a:t>
+            </a:r>
+            <a:r>
+              <a:rPr lang="de-DE" dirty="0" smtClean="0"/>
+              <a:t> (</a:t>
+            </a:r>
+            <a:r>
+              <a:rPr lang="de-DE" dirty="0" err="1" smtClean="0"/>
+              <a:t>nginx</a:t>
+            </a:r>
+            <a:r>
+              <a:rPr lang="de-DE" dirty="0" smtClean="0"/>
+              <a:t>, ...)</a:t>
+            </a:r>
+          </a:p>
+          <a:p>
+            <a:endParaRPr lang="de-DE" dirty="0"/>
+          </a:p>
+        </p:txBody>
+      </p:sp>
+    </p:spTree>
+    <p:extLst>
+      <p:ext uri="{BB962C8B-B14F-4D97-AF65-F5344CB8AC3E}">
+        <p14:creationId xmlns:p14="http://schemas.microsoft.com/office/powerpoint/2010/main" val="51044277"/>
+      </p:ext>
+    </p:extLst>
+  </p:cSld>
+  <p:clrMapOvr>
+    <a:masterClrMapping/>
+  </p:clrMapOvr>
+</p:sld>
+</file>
+
+<file path=ppt/slides/slide8.xml><?xml version="1.0" encoding="utf-8"?>
+<p:sld xmlns:a="http://schemas.openxmlformats.org/drawingml/2006/main" xmlns:r="http://schemas.openxmlformats.org/officeDocument/2006/relationships" xmlns:p="http://schemas.openxmlformats.org/presentationml/2006/main">
+  <p:cSld>
+    <p:spTree>
+      <p:nvGrpSpPr>
+        <p:cNvPr id="1" name=""/>
+        <p:cNvGrpSpPr/>
+        <p:nvPr/>
+      </p:nvGrpSpPr>
+      <p:grpSpPr>
+        <a:xfrm>
+          <a:off x="0" y="0"/>
+          <a:ext cx="0" cy="0"/>
+          <a:chOff x="0" y="0"/>
+          <a:chExt cx="0" cy="0"/>
+        </a:xfrm>
+      </p:grpSpPr>
+      <p:sp>
+        <p:nvSpPr>
           <p:cNvPr id="6" name="Titel 5"/>
           <p:cNvSpPr>
             <a:spLocks noGrp="1"/>
@@ -4611,61 +4927,64 @@
             <p:ph type="subTitle" idx="1"/>
           </p:nvPr>
         </p:nvSpPr>
-        <p:spPr/>
+        <p:spPr>
+          <a:xfrm>
+            <a:off x="474318" y="3289392"/>
+            <a:ext cx="8195364" cy="2349408"/>
+          </a:xfrm>
+        </p:spPr>
         <p:txBody>
           <a:bodyPr>
-            <a:normAutofit fontScale="77500" lnSpcReduction="20000"/>
+            <a:normAutofit/>
           </a:bodyPr>
           <a:lstStyle/>
           <a:p>
-            <a:r>
-              <a:rPr lang="de-DE" dirty="0" smtClean="0"/>
-              <a:t>https://</a:t>
-            </a:r>
-            <a:r>
-              <a:rPr lang="de-DE" dirty="0" err="1" smtClean="0"/>
-              <a:t>rhodecode.plunge.at</a:t>
-            </a:r>
-            <a:r>
-              <a:rPr lang="de-DE" dirty="0" smtClean="0"/>
-              <a:t>/ach/ach-master</a:t>
-            </a:r>
-          </a:p>
-          <a:p>
-            <a:r>
-              <a:rPr lang="de-DE" dirty="0" smtClean="0"/>
-              <a:t>Mailinglist: </a:t>
-            </a:r>
             <a:r>
               <a:rPr lang="de-DE" dirty="0" smtClean="0">
                 <a:hlinkClick r:id="rId2"/>
               </a:rPr>
-              <a:t>ach@</a:t>
+              <a:t>https://rhodecode.plunge.at/ach/ach-</a:t>
             </a:r>
             <a:r>
               <a:rPr lang="de-DE" dirty="0" smtClean="0">
                 <a:hlinkClick r:id="rId2"/>
               </a:rPr>
-              <a:t>lists.cert.at</a:t>
+              <a:t>master</a:t>
             </a:r>
             <a:endParaRPr lang="de-DE" dirty="0" smtClean="0"/>
           </a:p>
           <a:p>
+            <a:endParaRPr lang="de-DE" dirty="0" smtClean="0"/>
+          </a:p>
+          <a:p>
+            <a:r>
+              <a:rPr lang="de-DE" dirty="0" smtClean="0"/>
+              <a:t>Mailinglist: </a:t>
+            </a:r>
             <a:r>
               <a:rPr lang="de-DE" dirty="0" smtClean="0">
                 <a:hlinkClick r:id="rId3"/>
               </a:rPr>
+              <a:t>ach@lists.cert.at</a:t>
+            </a:r>
+            <a:endParaRPr lang="de-DE" dirty="0" smtClean="0"/>
+          </a:p>
+          <a:p>
+            <a:r>
+              <a:rPr lang="de-DE" dirty="0" smtClean="0">
+                <a:hlinkClick r:id="rId4"/>
+              </a:rPr>
               <a:t>http://lists.cert.at</a:t>
             </a:r>
             <a:r>
               <a:rPr lang="de-DE" dirty="0">
-                <a:hlinkClick r:id="rId3"/>
+                <a:hlinkClick r:id="rId4"/>
               </a:rPr>
               <a:t>/cgi-bin/mailman/listinfo/</a:t>
             </a:r>
             <a:r>
               <a:rPr lang="de-DE" dirty="0" smtClean="0">
-                <a:hlinkClick r:id="rId3"/>
+                <a:hlinkClick r:id="rId4"/>
               </a:rPr>
               <a:t>ach</a:t>
             </a:r>

</xml_diff>